<commit_message>
axes on percolation map
</commit_message>
<xml_diff>
--- a/poster.pptx
+++ b/poster.pptx
@@ -218,7 +218,7 @@
           <a:p>
             <a:fld id="{1E85E515-09CF-4A79-9E3E-7BA494E91A78}" type="datetimeFigureOut">
               <a:rPr lang="he-IL" smtClean="0"/>
-              <a:t>י"א/סיון/תשע"ו</a:t>
+              <a:t>י"ב/סיון/תשע"ו</a:t>
             </a:fld>
             <a:endParaRPr lang="he-IL"/>
           </a:p>
@@ -777,7 +777,7 @@
           <a:p>
             <a:fld id="{EF45E86C-8F83-45BC-8EDB-389DFE21BAD7}" type="datetimeFigureOut">
               <a:rPr lang="he-IL" smtClean="0"/>
-              <a:t>י"א/סיון/תשע"ו</a:t>
+              <a:t>י"ב/סיון/תשע"ו</a:t>
             </a:fld>
             <a:endParaRPr lang="he-IL"/>
           </a:p>
@@ -947,7 +947,7 @@
           <a:p>
             <a:fld id="{EF45E86C-8F83-45BC-8EDB-389DFE21BAD7}" type="datetimeFigureOut">
               <a:rPr lang="he-IL" smtClean="0"/>
-              <a:t>י"א/סיון/תשע"ו</a:t>
+              <a:t>י"ב/סיון/תשע"ו</a:t>
             </a:fld>
             <a:endParaRPr lang="he-IL"/>
           </a:p>
@@ -1127,7 +1127,7 @@
           <a:p>
             <a:fld id="{EF45E86C-8F83-45BC-8EDB-389DFE21BAD7}" type="datetimeFigureOut">
               <a:rPr lang="he-IL" smtClean="0"/>
-              <a:t>י"א/סיון/תשע"ו</a:t>
+              <a:t>י"ב/סיון/תשע"ו</a:t>
             </a:fld>
             <a:endParaRPr lang="he-IL"/>
           </a:p>
@@ -1297,7 +1297,7 @@
           <a:p>
             <a:fld id="{EF45E86C-8F83-45BC-8EDB-389DFE21BAD7}" type="datetimeFigureOut">
               <a:rPr lang="he-IL" smtClean="0"/>
-              <a:t>י"א/סיון/תשע"ו</a:t>
+              <a:t>י"ב/סיון/תשע"ו</a:t>
             </a:fld>
             <a:endParaRPr lang="he-IL"/>
           </a:p>
@@ -1543,7 +1543,7 @@
           <a:p>
             <a:fld id="{EF45E86C-8F83-45BC-8EDB-389DFE21BAD7}" type="datetimeFigureOut">
               <a:rPr lang="he-IL" smtClean="0"/>
-              <a:t>י"א/סיון/תשע"ו</a:t>
+              <a:t>י"ב/סיון/תשע"ו</a:t>
             </a:fld>
             <a:endParaRPr lang="he-IL"/>
           </a:p>
@@ -1831,7 +1831,7 @@
           <a:p>
             <a:fld id="{EF45E86C-8F83-45BC-8EDB-389DFE21BAD7}" type="datetimeFigureOut">
               <a:rPr lang="he-IL" smtClean="0"/>
-              <a:t>י"א/סיון/תשע"ו</a:t>
+              <a:t>י"ב/סיון/תשע"ו</a:t>
             </a:fld>
             <a:endParaRPr lang="he-IL"/>
           </a:p>
@@ -2253,7 +2253,7 @@
           <a:p>
             <a:fld id="{EF45E86C-8F83-45BC-8EDB-389DFE21BAD7}" type="datetimeFigureOut">
               <a:rPr lang="he-IL" smtClean="0"/>
-              <a:t>י"א/סיון/תשע"ו</a:t>
+              <a:t>י"ב/סיון/תשע"ו</a:t>
             </a:fld>
             <a:endParaRPr lang="he-IL"/>
           </a:p>
@@ -2371,7 +2371,7 @@
           <a:p>
             <a:fld id="{EF45E86C-8F83-45BC-8EDB-389DFE21BAD7}" type="datetimeFigureOut">
               <a:rPr lang="he-IL" smtClean="0"/>
-              <a:t>י"א/סיון/תשע"ו</a:t>
+              <a:t>י"ב/סיון/תשע"ו</a:t>
             </a:fld>
             <a:endParaRPr lang="he-IL"/>
           </a:p>
@@ -2466,7 +2466,7 @@
           <a:p>
             <a:fld id="{EF45E86C-8F83-45BC-8EDB-389DFE21BAD7}" type="datetimeFigureOut">
               <a:rPr lang="he-IL" smtClean="0"/>
-              <a:t>י"א/סיון/תשע"ו</a:t>
+              <a:t>י"ב/סיון/תשע"ו</a:t>
             </a:fld>
             <a:endParaRPr lang="he-IL"/>
           </a:p>
@@ -2743,7 +2743,7 @@
           <a:p>
             <a:fld id="{EF45E86C-8F83-45BC-8EDB-389DFE21BAD7}" type="datetimeFigureOut">
               <a:rPr lang="he-IL" smtClean="0"/>
-              <a:t>י"א/סיון/תשע"ו</a:t>
+              <a:t>י"ב/סיון/תשע"ו</a:t>
             </a:fld>
             <a:endParaRPr lang="he-IL"/>
           </a:p>
@@ -2996,7 +2996,7 @@
           <a:p>
             <a:fld id="{EF45E86C-8F83-45BC-8EDB-389DFE21BAD7}" type="datetimeFigureOut">
               <a:rPr lang="he-IL" smtClean="0"/>
-              <a:t>י"א/סיון/תשע"ו</a:t>
+              <a:t>י"ב/סיון/תשע"ו</a:t>
             </a:fld>
             <a:endParaRPr lang="he-IL"/>
           </a:p>
@@ -3209,7 +3209,7 @@
           <a:p>
             <a:fld id="{EF45E86C-8F83-45BC-8EDB-389DFE21BAD7}" type="datetimeFigureOut">
               <a:rPr lang="he-IL" smtClean="0"/>
-              <a:t>י"א/סיון/תשע"ו</a:t>
+              <a:t>י"ב/סיון/תשע"ו</a:t>
             </a:fld>
             <a:endParaRPr lang="he-IL"/>
           </a:p>
@@ -4203,8 +4203,8 @@
           <a:chExt cx="0" cy="0"/>
         </a:xfrm>
       </p:grpSpPr>
-      <mc:AlternateContent xmlns:mc="http://schemas.openxmlformats.org/markup-compatibility/2006">
-        <mc:Choice xmlns:a14="http://schemas.microsoft.com/office/drawing/2010/main" Requires="a14">
+      <mc:AlternateContent xmlns:mc="http://schemas.openxmlformats.org/markup-compatibility/2006" xmlns:a14="http://schemas.microsoft.com/office/drawing/2010/main">
+        <mc:Choice Requires="a14">
           <p:sp>
             <p:nvSpPr>
               <p:cNvPr id="3" name="Content Placeholder 2"/>
@@ -4458,7 +4458,7 @@
             </p:txBody>
           </p:sp>
         </mc:Choice>
-        <mc:Fallback>
+        <mc:Fallback xmlns="">
           <p:sp>
             <p:nvSpPr>
               <p:cNvPr id="3" name="Content Placeholder 2"/>
@@ -5603,10 +5603,6 @@
               <a:rPr lang="he-IL" dirty="0" smtClean="0"/>
               <a:t> מתנועת מערבולות בעל מוליך</a:t>
             </a:r>
-            <a:r>
-              <a:rPr lang="he-IL" dirty="0" smtClean="0"/>
-              <a:t/>
-            </a:r>
             <a:br>
               <a:rPr lang="he-IL" dirty="0" smtClean="0"/>
             </a:br>
@@ -5630,8 +5626,8 @@
           </a:p>
         </p:txBody>
       </p:sp>
-      <mc:AlternateContent xmlns:mc="http://schemas.openxmlformats.org/markup-compatibility/2006">
-        <mc:Choice xmlns:a14="http://schemas.microsoft.com/office/drawing/2010/main" Requires="a14">
+      <mc:AlternateContent xmlns:mc="http://schemas.openxmlformats.org/markup-compatibility/2006" xmlns:a14="http://schemas.microsoft.com/office/drawing/2010/main">
+        <mc:Choice Requires="a14">
           <p:sp>
             <p:nvSpPr>
               <p:cNvPr id="3" name="Content Placeholder 2"/>
@@ -5903,7 +5899,7 @@
             </p:txBody>
           </p:sp>
         </mc:Choice>
-        <mc:Fallback>
+        <mc:Fallback xmlns="">
           <p:sp>
             <p:nvSpPr>
               <p:cNvPr id="3" name="Content Placeholder 2"/>
@@ -6015,8 +6011,8 @@
           </a:extLst>
         </p:spPr>
       </p:pic>
-      <mc:AlternateContent xmlns:mc="http://schemas.openxmlformats.org/markup-compatibility/2006">
-        <mc:Choice xmlns:a14="http://schemas.microsoft.com/office/drawing/2010/main" Requires="a14">
+      <mc:AlternateContent xmlns:mc="http://schemas.openxmlformats.org/markup-compatibility/2006" xmlns:a14="http://schemas.microsoft.com/office/drawing/2010/main">
+        <mc:Choice Requires="a14">
           <p:sp>
             <p:nvSpPr>
               <p:cNvPr id="3" name="Content Placeholder 2"/>
@@ -6259,11 +6255,7 @@
                 </a:br>
                 <a:r>
                   <a:rPr lang="he-IL" dirty="0" smtClean="0"/>
-                  <a:t>במרחב שיגרום לתנועת </a:t>
-                </a:r>
-                <a:r>
-                  <a:rPr lang="he-IL" dirty="0" smtClean="0"/>
-                  <a:t>מערבולות</a:t>
+                  <a:t>במרחב שיגרום לתנועת מערבולות</a:t>
                 </a:r>
                 <a:r>
                   <a:rPr lang="en-US" dirty="0" smtClean="0"/>
@@ -6280,7 +6272,7 @@
             </p:txBody>
           </p:sp>
         </mc:Choice>
-        <mc:Fallback>
+        <mc:Fallback xmlns="">
           <p:sp>
             <p:nvSpPr>
               <p:cNvPr id="3" name="Content Placeholder 2"/>
@@ -6385,8 +6377,8 @@
           <a:chExt cx="0" cy="0"/>
         </a:xfrm>
       </p:grpSpPr>
-      <mc:AlternateContent xmlns:mc="http://schemas.openxmlformats.org/markup-compatibility/2006">
-        <mc:Choice xmlns:a14="http://schemas.microsoft.com/office/drawing/2010/main" Requires="a14">
+      <mc:AlternateContent xmlns:mc="http://schemas.openxmlformats.org/markup-compatibility/2006" xmlns:a14="http://schemas.microsoft.com/office/drawing/2010/main">
+        <mc:Choice Requires="a14">
           <p:sp>
             <p:nvSpPr>
               <p:cNvPr id="3" name="Content Placeholder 2"/>
@@ -6450,11 +6442,7 @@
                 </a:r>
                 <a:r>
                   <a:rPr lang="he-IL" dirty="0" smtClean="0"/>
-                  <a:t>התנועה משרה שדה חשמלי. </a:t>
-                </a:r>
-                <a:r>
-                  <a:rPr lang="he-IL" dirty="0" smtClean="0"/>
-                  <a:t>מודל </a:t>
+                  <a:t>התנועה משרה שדה חשמלי. מודל </a:t>
                 </a:r>
                 <a:r>
                   <a:rPr lang="en-US" dirty="0" smtClean="0"/>
@@ -6540,7 +6528,6 @@
                   <a:rPr lang="he-IL" b="1" dirty="0" smtClean="0"/>
                   <a:t>.</a:t>
                 </a:r>
-                <a:endParaRPr lang="he-IL" b="1" dirty="0" smtClean="0"/>
               </a:p>
               <a:p>
                 <a:pPr marL="0" indent="0">
@@ -6931,7 +6918,7 @@
             </p:txBody>
           </p:sp>
         </mc:Choice>
-        <mc:Fallback>
+        <mc:Fallback xmlns="">
           <p:sp>
             <p:nvSpPr>
               <p:cNvPr id="3" name="Content Placeholder 2"/>
@@ -7040,8 +7027,8 @@
           <a:chExt cx="0" cy="0"/>
         </a:xfrm>
       </p:grpSpPr>
-      <mc:AlternateContent xmlns:mc="http://schemas.openxmlformats.org/markup-compatibility/2006">
-        <mc:Choice xmlns:a14="http://schemas.microsoft.com/office/drawing/2010/main" Requires="a14">
+      <mc:AlternateContent xmlns:mc="http://schemas.openxmlformats.org/markup-compatibility/2006" xmlns:a14="http://schemas.microsoft.com/office/drawing/2010/main">
+        <mc:Choice Requires="a14">
           <p:sp>
             <p:nvSpPr>
               <p:cNvPr id="3" name="Content Placeholder 2"/>
@@ -7072,11 +7059,7 @@
                 </a:r>
                 <a:r>
                   <a:rPr lang="he-IL" dirty="0" smtClean="0"/>
-                  <a:t> בתוך </a:t>
-                </a:r>
-                <a:r>
-                  <a:rPr lang="he-IL" dirty="0" smtClean="0"/>
-                  <a:t>התקן ייעודי</a:t>
+                  <a:t> בתוך התקן ייעודי</a:t>
                 </a:r>
                 <a:endParaRPr lang="en-US" dirty="0" smtClean="0"/>
               </a:p>
@@ -7108,19 +7091,7 @@
               <a:p>
                 <a:r>
                   <a:rPr lang="he-IL" dirty="0" smtClean="0"/>
-                  <a:t>קירור </a:t>
-                </a:r>
-                <a:r>
-                  <a:rPr lang="he-IL" dirty="0" smtClean="0"/>
-                  <a:t>ע"י </a:t>
-                </a:r>
-                <a:r>
-                  <a:rPr lang="he-IL" dirty="0" smtClean="0"/>
-                  <a:t>חנקן </a:t>
-                </a:r>
-                <a:r>
-                  <a:rPr lang="he-IL" dirty="0" smtClean="0"/>
-                  <a:t>נוזלי (</a:t>
+                  <a:t>קירור ע"י חנקן נוזלי (</a:t>
                 </a:r>
                 <a14:m>
                   <m:oMath xmlns:m="http://schemas.openxmlformats.org/officeDocument/2006/math">
@@ -7159,7 +7130,7 @@
             </p:txBody>
           </p:sp>
         </mc:Choice>
-        <mc:Fallback>
+        <mc:Fallback xmlns="">
           <p:sp>
             <p:nvSpPr>
               <p:cNvPr id="3" name="Content Placeholder 2"/>
@@ -37073,15 +37044,7 @@
           <a:p>
             <a:r>
               <a:rPr lang="he-IL" sz="2400" dirty="0" smtClean="0"/>
-              <a:t>תילים משני </a:t>
-            </a:r>
-            <a:r>
-              <a:rPr lang="he-IL" sz="2400" dirty="0" smtClean="0"/>
-              <a:t>צדי </a:t>
-            </a:r>
-            <a:r>
-              <a:rPr lang="he-IL" sz="2400" dirty="0" smtClean="0"/>
-              <a:t>הדוגמה משרים שדה המשתנה לרוחבה</a:t>
+              <a:t>תילים משני צדי הדוגמה משרים שדה המשתנה לרוחבה</a:t>
             </a:r>
             <a:endParaRPr lang="he-IL" sz="2400" dirty="0"/>
           </a:p>
@@ -37154,8 +37117,8 @@
           </a:prstGeom>
         </p:spPr>
       </p:pic>
-      <mc:AlternateContent xmlns:mc="http://schemas.openxmlformats.org/markup-compatibility/2006">
-        <mc:Choice xmlns:a14="http://schemas.microsoft.com/office/drawing/2010/main" Requires="a14">
+      <mc:AlternateContent xmlns:mc="http://schemas.openxmlformats.org/markup-compatibility/2006" xmlns:a14="http://schemas.microsoft.com/office/drawing/2010/main">
+        <mc:Choice Requires="a14">
           <p:sp>
             <p:nvSpPr>
               <p:cNvPr id="3" name="Content Placeholder 2"/>
@@ -37178,7 +37141,6 @@
               </a:bodyPr>
               <a:lstStyle/>
               <a:p>
-                <a:pPr/>
                 <a:r>
                   <a:rPr lang="he-IL" dirty="0" smtClean="0"/>
                   <a:t>מדדנו פרופיל </a:t>
@@ -37394,11 +37356,7 @@
                 </a14:m>
                 <a:r>
                   <a:rPr lang="he-IL" dirty="0" smtClean="0"/>
-                  <a:t>, </a:t>
-                </a:r>
-                <a:r>
-                  <a:rPr lang="he-IL" dirty="0" smtClean="0"/>
-                  <a:t>מדדנו את </a:t>
+                  <a:t>, מדדנו את </a:t>
                 </a:r>
                 <a14:m>
                   <m:oMath xmlns:m="http://schemas.openxmlformats.org/officeDocument/2006/math">
@@ -37421,11 +37379,7 @@
                 </a14:m>
                 <a:r>
                   <a:rPr lang="he-IL" dirty="0" smtClean="0"/>
-                  <a:t> שנגרם ע"י </a:t>
-                </a:r>
-                <a:r>
-                  <a:rPr lang="he-IL" dirty="0" smtClean="0"/>
-                  <a:t>השפעת</a:t>
+                  <a:t> שנגרם ע"י השפעת</a:t>
                 </a:r>
                 <a:r>
                   <a:rPr lang="en-US" dirty="0" smtClean="0"/>
@@ -37607,7 +37561,7 @@
             </p:txBody>
           </p:sp>
         </mc:Choice>
-        <mc:Fallback>
+        <mc:Fallback xmlns="">
           <p:sp>
             <p:nvSpPr>
               <p:cNvPr id="3" name="Content Placeholder 2"/>
@@ -37938,8 +37892,8 @@
           </a:prstGeom>
         </p:spPr>
       </p:pic>
-      <mc:AlternateContent xmlns:mc="http://schemas.openxmlformats.org/markup-compatibility/2006">
-        <mc:Choice xmlns:a14="http://schemas.microsoft.com/office/drawing/2010/main" Requires="a14">
+      <mc:AlternateContent xmlns:mc="http://schemas.openxmlformats.org/markup-compatibility/2006" xmlns:a14="http://schemas.microsoft.com/office/drawing/2010/main">
+        <mc:Choice Requires="a14">
           <p:sp>
             <p:nvSpPr>
               <p:cNvPr id="3" name="Content Placeholder 2"/>
@@ -38191,7 +38145,7 @@
             </p:txBody>
           </p:sp>
         </mc:Choice>
-        <mc:Fallback>
+        <mc:Fallback xmlns="">
           <p:sp>
             <p:nvSpPr>
               <p:cNvPr id="3" name="Content Placeholder 2"/>
@@ -38229,49 +38183,8 @@
           </p:sp>
         </mc:Fallback>
       </mc:AlternateContent>
-      <p:pic>
-        <p:nvPicPr>
-          <p:cNvPr id="1026" name="Picture 2" descr="http://www.math.uiuc.edu/~kkirkpat/perc2.png"/>
-          <p:cNvPicPr>
-            <a:picLocks noChangeAspect="1" noChangeArrowheads="1"/>
-          </p:cNvPicPr>
-          <p:nvPr/>
-        </p:nvPicPr>
-        <p:blipFill>
-          <a:blip r:embed="rId4">
-            <a:extLst>
-              <a:ext uri="{28A0092B-C50C-407E-A947-70E740481C1C}">
-                <a14:useLocalDpi xmlns:a14="http://schemas.microsoft.com/office/drawing/2010/main" val="0"/>
-              </a:ext>
-            </a:extLst>
-          </a:blip>
-          <a:srcRect/>
-          <a:stretch>
-            <a:fillRect/>
-          </a:stretch>
-        </p:blipFill>
-        <p:spPr bwMode="auto">
-          <a:xfrm>
-            <a:off x="395536" y="332656"/>
-            <a:ext cx="3333750" cy="3314700"/>
-          </a:xfrm>
-          <a:prstGeom prst="rect">
-            <a:avLst/>
-          </a:prstGeom>
-          <a:noFill/>
-          <a:extLst>
-            <a:ext uri="{909E8E84-426E-40DD-AFC4-6F175D3DCCD1}">
-              <a14:hiddenFill xmlns:a14="http://schemas.microsoft.com/office/drawing/2010/main">
-                <a:solidFill>
-                  <a:srgbClr val="FFFFFF"/>
-                </a:solidFill>
-              </a14:hiddenFill>
-            </a:ext>
-          </a:extLst>
-        </p:spPr>
-      </p:pic>
-      <mc:AlternateContent xmlns:mc="http://schemas.openxmlformats.org/markup-compatibility/2006">
-        <mc:Choice xmlns:a14="http://schemas.microsoft.com/office/drawing/2010/main" Requires="a14">
+      <mc:AlternateContent xmlns:mc="http://schemas.openxmlformats.org/markup-compatibility/2006" xmlns:a14="http://schemas.microsoft.com/office/drawing/2010/main">
+        <mc:Choice Requires="a14">
           <p:sp>
             <p:nvSpPr>
               <p:cNvPr id="4" name="TextBox 3"/>
@@ -38448,7 +38361,7 @@
             </p:txBody>
           </p:sp>
         </mc:Choice>
-        <mc:Fallback>
+        <mc:Fallback xmlns="">
           <p:sp>
             <p:nvSpPr>
               <p:cNvPr id="4" name="TextBox 3"/>
@@ -38487,6 +38400,339 @@
           </p:sp>
         </mc:Fallback>
       </mc:AlternateContent>
+      <p:grpSp>
+        <p:nvGrpSpPr>
+          <p:cNvPr id="15" name="Group 14"/>
+          <p:cNvGrpSpPr/>
+          <p:nvPr/>
+        </p:nvGrpSpPr>
+        <p:grpSpPr>
+          <a:xfrm>
+            <a:off x="186605" y="-8319"/>
+            <a:ext cx="3895628" cy="3684128"/>
+            <a:chOff x="186605" y="-8319"/>
+            <a:chExt cx="3895628" cy="3684128"/>
+          </a:xfrm>
+        </p:grpSpPr>
+        <p:pic>
+          <p:nvPicPr>
+            <p:cNvPr id="1026" name="Picture 2" descr="http://www.math.uiuc.edu/~kkirkpat/perc2.png"/>
+            <p:cNvPicPr>
+              <a:picLocks noChangeAspect="1" noChangeArrowheads="1"/>
+            </p:cNvPicPr>
+            <p:nvPr/>
+          </p:nvPicPr>
+          <p:blipFill>
+            <a:blip r:embed="rId6">
+              <a:extLst>
+                <a:ext uri="{28A0092B-C50C-407E-A947-70E740481C1C}">
+                  <a14:useLocalDpi xmlns:a14="http://schemas.microsoft.com/office/drawing/2010/main" val="0"/>
+                </a:ext>
+              </a:extLst>
+            </a:blip>
+            <a:srcRect/>
+            <a:stretch>
+              <a:fillRect/>
+            </a:stretch>
+          </p:blipFill>
+          <p:spPr bwMode="auto">
+            <a:xfrm>
+              <a:off x="395536" y="332656"/>
+              <a:ext cx="3333750" cy="3314700"/>
+            </a:xfrm>
+            <a:prstGeom prst="rect">
+              <a:avLst/>
+            </a:prstGeom>
+            <a:noFill/>
+            <a:extLst>
+              <a:ext uri="{909E8E84-426E-40DD-AFC4-6F175D3DCCD1}">
+                <a14:hiddenFill xmlns:a14="http://schemas.microsoft.com/office/drawing/2010/main">
+                  <a:solidFill>
+                    <a:srgbClr val="FFFFFF"/>
+                  </a:solidFill>
+                </a14:hiddenFill>
+              </a:ext>
+            </a:extLst>
+          </p:spPr>
+        </p:pic>
+        <p:grpSp>
+          <p:nvGrpSpPr>
+            <p:cNvPr id="13" name="Group 12"/>
+            <p:cNvGrpSpPr/>
+            <p:nvPr/>
+          </p:nvGrpSpPr>
+          <p:grpSpPr>
+            <a:xfrm>
+              <a:off x="186605" y="-8319"/>
+              <a:ext cx="3895628" cy="3684128"/>
+              <a:chOff x="186605" y="-8319"/>
+              <a:chExt cx="3895628" cy="3684128"/>
+            </a:xfrm>
+          </p:grpSpPr>
+          <p:cxnSp>
+            <p:nvCxnSpPr>
+              <p:cNvPr id="6" name="Straight Arrow Connector 5"/>
+              <p:cNvCxnSpPr/>
+              <p:nvPr/>
+            </p:nvCxnSpPr>
+            <p:spPr>
+              <a:xfrm>
+                <a:off x="409825" y="3640261"/>
+                <a:ext cx="3528392" cy="0"/>
+              </a:xfrm>
+              <a:prstGeom prst="straightConnector1">
+                <a:avLst/>
+              </a:prstGeom>
+              <a:ln w="12700">
+                <a:solidFill>
+                  <a:schemeClr val="tx1"/>
+                </a:solidFill>
+                <a:tailEnd type="triangle"/>
+              </a:ln>
+            </p:spPr>
+            <p:style>
+              <a:lnRef idx="1">
+                <a:schemeClr val="accent1"/>
+              </a:lnRef>
+              <a:fillRef idx="0">
+                <a:schemeClr val="accent1"/>
+              </a:fillRef>
+              <a:effectRef idx="0">
+                <a:schemeClr val="accent1"/>
+              </a:effectRef>
+              <a:fontRef idx="minor">
+                <a:schemeClr val="tx1"/>
+              </a:fontRef>
+            </p:style>
+          </p:cxnSp>
+          <p:cxnSp>
+            <p:nvCxnSpPr>
+              <p:cNvPr id="8" name="Straight Arrow Connector 7"/>
+              <p:cNvCxnSpPr/>
+              <p:nvPr/>
+            </p:nvCxnSpPr>
+            <p:spPr>
+              <a:xfrm flipV="1">
+                <a:off x="414588" y="188640"/>
+                <a:ext cx="0" cy="3451622"/>
+              </a:xfrm>
+              <a:prstGeom prst="straightConnector1">
+                <a:avLst/>
+              </a:prstGeom>
+              <a:ln w="12700">
+                <a:solidFill>
+                  <a:schemeClr val="tx1"/>
+                </a:solidFill>
+                <a:tailEnd type="triangle"/>
+              </a:ln>
+            </p:spPr>
+            <p:style>
+              <a:lnRef idx="1">
+                <a:schemeClr val="accent1"/>
+              </a:lnRef>
+              <a:fillRef idx="0">
+                <a:schemeClr val="accent1"/>
+              </a:fillRef>
+              <a:effectRef idx="0">
+                <a:schemeClr val="accent1"/>
+              </a:effectRef>
+              <a:fontRef idx="minor">
+                <a:schemeClr val="tx1"/>
+              </a:fontRef>
+            </p:style>
+          </p:cxnSp>
+          <mc:AlternateContent xmlns:mc="http://schemas.openxmlformats.org/markup-compatibility/2006">
+            <mc:Choice xmlns:a14="http://schemas.microsoft.com/office/drawing/2010/main" Requires="a14">
+              <p:sp>
+                <p:nvSpPr>
+                  <p:cNvPr id="10" name="TextBox 9"/>
+                  <p:cNvSpPr txBox="1"/>
+                  <p:nvPr/>
+                </p:nvSpPr>
+                <p:spPr>
+                  <a:xfrm>
+                    <a:off x="186605" y="-8319"/>
+                    <a:ext cx="288032" cy="369332"/>
+                  </a:xfrm>
+                  <a:prstGeom prst="rect">
+                    <a:avLst/>
+                  </a:prstGeom>
+                  <a:noFill/>
+                </p:spPr>
+                <p:txBody>
+                  <a:bodyPr wrap="square" rtlCol="0">
+                    <a:spAutoFit/>
+                  </a:bodyPr>
+                  <a:lstStyle/>
+                  <a:p>
+                    <a14:m>
+                      <m:oMathPara xmlns:m="http://schemas.openxmlformats.org/officeDocument/2006/math">
+                        <m:oMathParaPr>
+                          <m:jc m:val="centerGroup"/>
+                        </m:oMathParaPr>
+                        <m:oMath xmlns:m="http://schemas.openxmlformats.org/officeDocument/2006/math">
+                          <m:acc>
+                            <m:accPr>
+                              <m:chr m:val="̂"/>
+                              <m:ctrlPr>
+                                <a:rPr lang="en-US" b="0" i="1" smtClean="0">
+                                  <a:latin typeface="Cambria Math" panose="02040503050406030204" pitchFamily="18" charset="0"/>
+                                </a:rPr>
+                              </m:ctrlPr>
+                            </m:accPr>
+                            <m:e>
+                              <m:r>
+                                <a:rPr lang="en-US" b="0" i="1" smtClean="0">
+                                  <a:latin typeface="Cambria Math" panose="02040503050406030204" pitchFamily="18" charset="0"/>
+                                </a:rPr>
+                                <m:t>𝑧</m:t>
+                              </m:r>
+                            </m:e>
+                          </m:acc>
+                        </m:oMath>
+                      </m:oMathPara>
+                    </a14:m>
+                    <a:endParaRPr lang="en-US" dirty="0"/>
+                  </a:p>
+                </p:txBody>
+              </p:sp>
+            </mc:Choice>
+            <mc:Fallback>
+              <p:sp>
+                <p:nvSpPr>
+                  <p:cNvPr id="10" name="TextBox 9"/>
+                  <p:cNvSpPr txBox="1">
+                    <a:spLocks noRot="1" noChangeAspect="1" noMove="1" noResize="1" noEditPoints="1" noAdjustHandles="1" noChangeArrowheads="1" noChangeShapeType="1" noTextEdit="1"/>
+                  </p:cNvSpPr>
+                  <p:nvPr/>
+                </p:nvSpPr>
+                <p:spPr>
+                  <a:xfrm>
+                    <a:off x="186605" y="-8319"/>
+                    <a:ext cx="288032" cy="369332"/>
+                  </a:xfrm>
+                  <a:prstGeom prst="rect">
+                    <a:avLst/>
+                  </a:prstGeom>
+                  <a:blipFill rotWithShape="0">
+                    <a:blip r:embed="rId7"/>
+                    <a:stretch>
+                      <a:fillRect t="-6667" r="-34043"/>
+                    </a:stretch>
+                  </a:blipFill>
+                </p:spPr>
+                <p:txBody>
+                  <a:bodyPr/>
+                  <a:lstStyle/>
+                  <a:p>
+                    <a:r>
+                      <a:rPr lang="en-US">
+                        <a:noFill/>
+                      </a:rPr>
+                      <a:t> </a:t>
+                    </a:r>
+                  </a:p>
+                </p:txBody>
+              </p:sp>
+            </mc:Fallback>
+          </mc:AlternateContent>
+          <mc:AlternateContent xmlns:mc="http://schemas.openxmlformats.org/markup-compatibility/2006">
+            <mc:Choice xmlns:a14="http://schemas.microsoft.com/office/drawing/2010/main" Requires="a14">
+              <p:sp>
+                <p:nvSpPr>
+                  <p:cNvPr id="14" name="TextBox 13"/>
+                  <p:cNvSpPr txBox="1"/>
+                  <p:nvPr/>
+                </p:nvSpPr>
+                <p:spPr>
+                  <a:xfrm>
+                    <a:off x="3794201" y="3306477"/>
+                    <a:ext cx="288032" cy="369332"/>
+                  </a:xfrm>
+                  <a:prstGeom prst="rect">
+                    <a:avLst/>
+                  </a:prstGeom>
+                  <a:noFill/>
+                </p:spPr>
+                <p:txBody>
+                  <a:bodyPr wrap="square" rtlCol="0">
+                    <a:spAutoFit/>
+                  </a:bodyPr>
+                  <a:lstStyle/>
+                  <a:p>
+                    <a14:m>
+                      <m:oMathPara xmlns:m="http://schemas.openxmlformats.org/officeDocument/2006/math">
+                        <m:oMathParaPr>
+                          <m:jc m:val="centerGroup"/>
+                        </m:oMathParaPr>
+                        <m:oMath xmlns:m="http://schemas.openxmlformats.org/officeDocument/2006/math">
+                          <m:acc>
+                            <m:accPr>
+                              <m:chr m:val="̂"/>
+                              <m:ctrlPr>
+                                <a:rPr lang="en-US" b="0" i="1" smtClean="0">
+                                  <a:latin typeface="Cambria Math" panose="02040503050406030204" pitchFamily="18" charset="0"/>
+                                </a:rPr>
+                              </m:ctrlPr>
+                            </m:accPr>
+                            <m:e>
+                              <m:r>
+                                <a:rPr lang="en-US" b="0" i="1" smtClean="0">
+                                  <a:latin typeface="Cambria Math" panose="02040503050406030204" pitchFamily="18" charset="0"/>
+                                </a:rPr>
+                                <m:t>𝑥</m:t>
+                              </m:r>
+                            </m:e>
+                          </m:acc>
+                        </m:oMath>
+                      </m:oMathPara>
+                    </a14:m>
+                    <a:endParaRPr lang="en-US" dirty="0"/>
+                  </a:p>
+                </p:txBody>
+              </p:sp>
+            </mc:Choice>
+            <mc:Fallback>
+              <p:sp>
+                <p:nvSpPr>
+                  <p:cNvPr id="14" name="TextBox 13"/>
+                  <p:cNvSpPr txBox="1">
+                    <a:spLocks noRot="1" noChangeAspect="1" noMove="1" noResize="1" noEditPoints="1" noAdjustHandles="1" noChangeArrowheads="1" noChangeShapeType="1" noTextEdit="1"/>
+                  </p:cNvSpPr>
+                  <p:nvPr/>
+                </p:nvSpPr>
+                <p:spPr>
+                  <a:xfrm>
+                    <a:off x="3794201" y="3306477"/>
+                    <a:ext cx="288032" cy="369332"/>
+                  </a:xfrm>
+                  <a:prstGeom prst="rect">
+                    <a:avLst/>
+                  </a:prstGeom>
+                  <a:blipFill rotWithShape="0">
+                    <a:blip r:embed="rId8"/>
+                    <a:stretch>
+                      <a:fillRect t="-6557" r="-8333"/>
+                    </a:stretch>
+                  </a:blipFill>
+                </p:spPr>
+                <p:txBody>
+                  <a:bodyPr/>
+                  <a:lstStyle/>
+                  <a:p>
+                    <a:r>
+                      <a:rPr lang="en-US">
+                        <a:noFill/>
+                      </a:rPr>
+                      <a:t> </a:t>
+                    </a:r>
+                  </a:p>
+                </p:txBody>
+              </p:sp>
+            </mc:Fallback>
+          </mc:AlternateContent>
+        </p:grpSp>
+      </p:grpSp>
     </p:spTree>
     <p:extLst>
       <p:ext uri="{BB962C8B-B14F-4D97-AF65-F5344CB8AC3E}">

</xml_diff>